<commit_message>
reasoning back-end decision for Cross-Platform Notifications Plugin for Unity
</commit_message>
<xml_diff>
--- a/Dokumentation/Back End.pptx
+++ b/Dokumentation/Back End.pptx
@@ -5,10 +5,10 @@
     <p:sldMasterId id="2147483648" r:id="rId1"/>
   </p:sldMasterIdLst>
   <p:notesMasterIdLst>
-    <p:notesMasterId r:id="rId14"/>
+    <p:notesMasterId r:id="rId16"/>
   </p:notesMasterIdLst>
   <p:handoutMasterIdLst>
-    <p:handoutMasterId r:id="rId15"/>
+    <p:handoutMasterId r:id="rId17"/>
   </p:handoutMasterIdLst>
   <p:sldIdLst>
     <p:sldId id="256" r:id="rId2"/>
@@ -19,10 +19,12 @@
     <p:sldId id="263" r:id="rId7"/>
     <p:sldId id="267" r:id="rId8"/>
     <p:sldId id="265" r:id="rId9"/>
-    <p:sldId id="268" r:id="rId10"/>
-    <p:sldId id="264" r:id="rId11"/>
-    <p:sldId id="266" r:id="rId12"/>
-    <p:sldId id="269" r:id="rId13"/>
+    <p:sldId id="264" r:id="rId10"/>
+    <p:sldId id="266" r:id="rId11"/>
+    <p:sldId id="269" r:id="rId12"/>
+    <p:sldId id="268" r:id="rId13"/>
+    <p:sldId id="270" r:id="rId14"/>
+    <p:sldId id="271" r:id="rId15"/>
   </p:sldIdLst>
   <p:sldSz cx="9144000" cy="6858000" type="screen4x3"/>
   <p:notesSz cx="6858000" cy="9144000"/>
@@ -206,7 +208,7 @@
           <a:p>
             <a:fld id="{33F124CA-B914-F340-A109-E5531EDBFE7B}" type="datetimeFigureOut">
               <a:rPr lang="de-DE" smtClean="0"/>
-              <a:t>22/10/13</a:t>
+              <a:t>28/10/13</a:t>
             </a:fld>
             <a:endParaRPr lang="de-DE"/>
           </a:p>
@@ -372,7 +374,7 @@
           <a:p>
             <a:fld id="{1F044181-0ADD-D848-826A-A7744A795D5C}" type="datetimeFigureOut">
               <a:rPr lang="de-DE" smtClean="0"/>
-              <a:t>22/10/13</a:t>
+              <a:t>28/10/13</a:t>
             </a:fld>
             <a:endParaRPr lang="de-DE"/>
           </a:p>
@@ -822,7 +824,7 @@
           <a:p>
             <a:fld id="{03705AC5-A19C-8F4A-8847-368AED4628EF}" type="datetime1">
               <a:rPr lang="en-US" smtClean="0"/>
-              <a:t>22/10/13</a:t>
+              <a:t>28/10/13</a:t>
             </a:fld>
             <a:endParaRPr lang="de-DE"/>
           </a:p>
@@ -996,7 +998,7 @@
           <a:p>
             <a:fld id="{8D69D4D6-CCA3-944B-B9B0-C5D2AE8842BE}" type="datetime1">
               <a:rPr lang="en-US" smtClean="0"/>
-              <a:t>22/10/13</a:t>
+              <a:t>28/10/13</a:t>
             </a:fld>
             <a:endParaRPr lang="de-DE"/>
           </a:p>
@@ -1180,7 +1182,7 @@
           <a:p>
             <a:fld id="{A9423939-50B2-2A47-9BDE-BA876C40CB93}" type="datetime1">
               <a:rPr lang="en-US" smtClean="0"/>
-              <a:t>22/10/13</a:t>
+              <a:t>28/10/13</a:t>
             </a:fld>
             <a:endParaRPr lang="de-DE"/>
           </a:p>
@@ -1354,7 +1356,7 @@
           <a:p>
             <a:fld id="{B54C1B48-3F9B-1C40-8516-F06ECAB12DA3}" type="datetime1">
               <a:rPr lang="en-US" smtClean="0"/>
-              <a:t>22/10/13</a:t>
+              <a:t>28/10/13</a:t>
             </a:fld>
             <a:endParaRPr lang="de-DE"/>
           </a:p>
@@ -1604,7 +1606,7 @@
           <a:p>
             <a:fld id="{36C3DBB7-E33A-814B-B85A-4792887613D1}" type="datetime1">
               <a:rPr lang="en-US" smtClean="0"/>
-              <a:t>22/10/13</a:t>
+              <a:t>28/10/13</a:t>
             </a:fld>
             <a:endParaRPr lang="de-DE"/>
           </a:p>
@@ -1896,7 +1898,7 @@
           <a:p>
             <a:fld id="{65CC0F5B-549C-2B4F-8CF7-E94518D3615E}" type="datetime1">
               <a:rPr lang="en-US" smtClean="0"/>
-              <a:t>22/10/13</a:t>
+              <a:t>28/10/13</a:t>
             </a:fld>
             <a:endParaRPr lang="de-DE"/>
           </a:p>
@@ -2322,7 +2324,7 @@
           <a:p>
             <a:fld id="{445C7767-5940-754C-9925-7413CC08C9F8}" type="datetime1">
               <a:rPr lang="en-US" smtClean="0"/>
-              <a:t>22/10/13</a:t>
+              <a:t>28/10/13</a:t>
             </a:fld>
             <a:endParaRPr lang="de-DE"/>
           </a:p>
@@ -2444,7 +2446,7 @@
           <a:p>
             <a:fld id="{3DB1C466-6B9C-634C-89EA-6BE2E70DFFC9}" type="datetime1">
               <a:rPr lang="en-US" smtClean="0"/>
-              <a:t>22/10/13</a:t>
+              <a:t>28/10/13</a:t>
             </a:fld>
             <a:endParaRPr lang="de-DE"/>
           </a:p>
@@ -2543,7 +2545,7 @@
           <a:p>
             <a:fld id="{A54D34DD-1964-B44A-86EF-0290DFB02D2A}" type="datetime1">
               <a:rPr lang="en-US" smtClean="0"/>
-              <a:t>22/10/13</a:t>
+              <a:t>28/10/13</a:t>
             </a:fld>
             <a:endParaRPr lang="de-DE"/>
           </a:p>
@@ -2824,7 +2826,7 @@
           <a:p>
             <a:fld id="{2D6F8105-FA6B-7741-BEA0-22A7A51280B8}" type="datetime1">
               <a:rPr lang="en-US" smtClean="0"/>
-              <a:t>22/10/13</a:t>
+              <a:t>28/10/13</a:t>
             </a:fld>
             <a:endParaRPr lang="de-DE"/>
           </a:p>
@@ -3081,7 +3083,7 @@
           <a:p>
             <a:fld id="{A03BE7BD-543F-0448-924F-CE9E00F7CCF1}" type="datetime1">
               <a:rPr lang="en-US" smtClean="0"/>
-              <a:t>22/10/13</a:t>
+              <a:t>28/10/13</a:t>
             </a:fld>
             <a:endParaRPr lang="de-DE"/>
           </a:p>
@@ -3298,7 +3300,7 @@
           <a:p>
             <a:fld id="{88545085-6269-0C4B-BCEC-96F885BD1360}" type="datetime1">
               <a:rPr lang="en-US" smtClean="0"/>
-              <a:t>22/10/13</a:t>
+              <a:t>28/10/13</a:t>
             </a:fld>
             <a:endParaRPr lang="de-DE"/>
           </a:p>
@@ -3858,7 +3860,7 @@
           <a:p>
             <a:r>
               <a:rPr lang="de-DE" dirty="0" err="1" smtClean="0"/>
-              <a:t>PhoneGap</a:t>
+              <a:t>Xamarin</a:t>
             </a:r>
             <a:endParaRPr lang="de-DE" dirty="0" smtClean="0"/>
           </a:p>
@@ -3893,6 +3895,25 @@
             </a:r>
           </a:p>
           <a:p>
+            <a:pPr lvl="2"/>
+            <a:r>
+              <a:rPr lang="de-DE" dirty="0" smtClean="0"/>
+              <a:t>Parse SDK für Push </a:t>
+            </a:r>
+            <a:r>
+              <a:rPr lang="de-DE" dirty="0" err="1" smtClean="0"/>
+              <a:t>Notifications</a:t>
+            </a:r>
+            <a:endParaRPr lang="de-DE" dirty="0" smtClean="0"/>
+          </a:p>
+          <a:p>
+            <a:pPr lvl="2"/>
+            <a:r>
+              <a:rPr lang="de-DE" dirty="0" smtClean="0"/>
+              <a:t>Kostenlose Version verwendbar</a:t>
+            </a:r>
+          </a:p>
+          <a:p>
             <a:pPr lvl="1"/>
             <a:r>
               <a:rPr lang="de-DE" dirty="0" smtClean="0"/>
@@ -3903,58 +3924,72 @@
             <a:pPr lvl="2"/>
             <a:r>
               <a:rPr lang="de-DE" dirty="0" smtClean="0"/>
-              <a:t>Push </a:t>
-            </a:r>
-            <a:r>
-              <a:rPr lang="de-DE" dirty="0" err="1" smtClean="0"/>
-              <a:t>Notifications</a:t>
-            </a:r>
-            <a:r>
-              <a:rPr lang="de-DE" dirty="0" smtClean="0"/>
-              <a:t> nur durch </a:t>
-            </a:r>
-            <a:r>
-              <a:rPr lang="de-DE" dirty="0" err="1" smtClean="0"/>
-              <a:t>Plugins</a:t>
-            </a:r>
-            <a:r>
-              <a:rPr lang="de-DE" dirty="0" smtClean="0"/>
-              <a:t> </a:t>
-            </a:r>
-            <a:r>
-              <a:rPr lang="de-DE" dirty="0" err="1" smtClean="0"/>
-              <a:t>einbindbar</a:t>
-            </a:r>
+              <a:t>Cross-</a:t>
+            </a:r>
+            <a:r>
+              <a:rPr lang="de-DE" dirty="0" err="1" smtClean="0"/>
+              <a:t>Platform</a:t>
+            </a:r>
+            <a:r>
+              <a:rPr lang="de-DE" dirty="0" smtClean="0"/>
+              <a:t> Projekt schwierig aufzusetzen</a:t>
+            </a:r>
+          </a:p>
+          <a:p>
+            <a:pPr lvl="2"/>
             <a:endParaRPr lang="de-DE" dirty="0" smtClean="0"/>
           </a:p>
-          <a:p>
-            <a:pPr lvl="2"/>
-            <a:r>
-              <a:rPr lang="de-DE" dirty="0" smtClean="0"/>
-              <a:t>Schönere Alternative: </a:t>
-            </a:r>
-            <a:r>
-              <a:rPr lang="de-DE" dirty="0" err="1" smtClean="0"/>
-              <a:t>Xamarin</a:t>
-            </a:r>
-            <a:r>
-              <a:rPr lang="de-DE" dirty="0" smtClean="0"/>
-              <a:t> + </a:t>
-            </a:r>
-            <a:r>
-              <a:rPr lang="de-DE" dirty="0" smtClean="0"/>
-              <a:t>Parse </a:t>
-            </a:r>
-            <a:r>
-              <a:rPr lang="de-DE" dirty="0" smtClean="0"/>
-              <a:t>SDK</a:t>
-            </a:r>
+        </p:txBody>
+      </p:sp>
+      <p:sp>
+        <p:nvSpPr>
+          <p:cNvPr id="6" name="Fußzeilenplatzhalter 5"/>
+          <p:cNvSpPr>
+            <a:spLocks noGrp="1"/>
+          </p:cNvSpPr>
+          <p:nvPr>
+            <p:ph type="ftr" sz="quarter" idx="11"/>
+          </p:nvPr>
+        </p:nvSpPr>
+        <p:spPr/>
+        <p:txBody>
+          <a:bodyPr/>
+          <a:lstStyle/>
+          <a:p>
+            <a:r>
+              <a:rPr lang="de-DE" smtClean="0"/>
+              <a:t>Aquatic Space - Back End</a:t>
+            </a:r>
+            <a:endParaRPr lang="de-DE"/>
+          </a:p>
+        </p:txBody>
+      </p:sp>
+      <p:sp>
+        <p:nvSpPr>
+          <p:cNvPr id="7" name="Foliennummernplatzhalter 6"/>
+          <p:cNvSpPr>
+            <a:spLocks noGrp="1"/>
+          </p:cNvSpPr>
+          <p:nvPr>
+            <p:ph type="sldNum" sz="quarter" idx="12"/>
+          </p:nvPr>
+        </p:nvSpPr>
+        <p:spPr/>
+        <p:txBody>
+          <a:bodyPr/>
+          <a:lstStyle/>
+          <a:p>
+            <a:fld id="{2E18F249-BDE3-A64A-9BF3-08DB2E7D85BD}" type="slidenum">
+              <a:rPr lang="de-DE" smtClean="0"/>
+              <a:t>10</a:t>
+            </a:fld>
+            <a:endParaRPr lang="de-DE"/>
           </a:p>
         </p:txBody>
       </p:sp>
       <p:pic>
         <p:nvPicPr>
-          <p:cNvPr id="5" name="Bild 4"/>
+          <p:cNvPr id="4" name="Bild 3"/>
           <p:cNvPicPr>
             <a:picLocks noChangeAspect="1"/>
           </p:cNvPicPr>
@@ -3968,8 +4003,8 @@
         </p:blipFill>
         <p:spPr>
           <a:xfrm>
-            <a:off x="3021453" y="1244135"/>
-            <a:ext cx="1344577" cy="1344577"/>
+            <a:off x="2704207" y="1417638"/>
+            <a:ext cx="1053098" cy="1053098"/>
           </a:xfrm>
           <a:prstGeom prst="rect">
             <a:avLst/>
@@ -3978,54 +4013,134 @@
       </p:pic>
       <p:sp>
         <p:nvSpPr>
-          <p:cNvPr id="6" name="Fußzeilenplatzhalter 5"/>
-          <p:cNvSpPr>
-            <a:spLocks noGrp="1"/>
-          </p:cNvSpPr>
-          <p:nvPr>
-            <p:ph type="ftr" sz="quarter" idx="11"/>
-          </p:nvPr>
-        </p:nvSpPr>
-        <p:spPr/>
-        <p:txBody>
-          <a:bodyPr/>
-          <a:lstStyle/>
-          <a:p>
-            <a:r>
-              <a:rPr lang="de-DE" smtClean="0"/>
-              <a:t>Aquatic Space - Back End</a:t>
-            </a:r>
-            <a:endParaRPr lang="de-DE"/>
-          </a:p>
-        </p:txBody>
-      </p:sp>
-      <p:sp>
-        <p:nvSpPr>
-          <p:cNvPr id="7" name="Foliennummernplatzhalter 6"/>
-          <p:cNvSpPr>
-            <a:spLocks noGrp="1"/>
-          </p:cNvSpPr>
-          <p:nvPr>
-            <p:ph type="sldNum" sz="quarter" idx="12"/>
-          </p:nvPr>
-        </p:nvSpPr>
-        <p:spPr/>
-        <p:txBody>
-          <a:bodyPr/>
-          <a:lstStyle/>
-          <a:p>
-            <a:fld id="{2E18F249-BDE3-A64A-9BF3-08DB2E7D85BD}" type="slidenum">
-              <a:rPr lang="de-DE" smtClean="0"/>
-              <a:t>10</a:t>
-            </a:fld>
-            <a:endParaRPr lang="de-DE"/>
+          <p:cNvPr id="8" name="Textfeld 7"/>
+          <p:cNvSpPr txBox="1"/>
+          <p:nvPr/>
+        </p:nvSpPr>
+        <p:spPr>
+          <a:xfrm>
+            <a:off x="457200" y="5164126"/>
+            <a:ext cx="8085946" cy="646331"/>
+          </a:xfrm>
+          <a:prstGeom prst="rect">
+            <a:avLst/>
+          </a:prstGeom>
+          <a:noFill/>
+        </p:spPr>
+        <p:txBody>
+          <a:bodyPr wrap="square" rtlCol="0">
+            <a:spAutoFit/>
+          </a:bodyPr>
+          <a:lstStyle/>
+          <a:p>
+            <a:r>
+              <a:rPr lang="de-DE" sz="3600" b="1" dirty="0" smtClean="0">
+                <a:ln w="12700">
+                  <a:solidFill>
+                    <a:schemeClr val="tx2">
+                      <a:satMod val="155000"/>
+                    </a:schemeClr>
+                  </a:solidFill>
+                  <a:prstDash val="solid"/>
+                </a:ln>
+                <a:solidFill>
+                  <a:schemeClr val="bg2">
+                    <a:tint val="85000"/>
+                    <a:satMod val="155000"/>
+                  </a:schemeClr>
+                </a:solidFill>
+                <a:effectLst>
+                  <a:outerShdw blurRad="41275" dist="20320" dir="1800000" algn="tl" rotWithShape="0">
+                    <a:srgbClr val="000000">
+                      <a:alpha val="40000"/>
+                    </a:srgbClr>
+                  </a:outerShdw>
+                </a:effectLst>
+              </a:rPr>
+              <a:t>1. Wahl für Entwicklung der </a:t>
+            </a:r>
+            <a:r>
+              <a:rPr lang="de-DE" sz="3600" b="1" dirty="0" err="1" smtClean="0">
+                <a:ln w="12700">
+                  <a:solidFill>
+                    <a:schemeClr val="tx2">
+                      <a:satMod val="155000"/>
+                    </a:schemeClr>
+                  </a:solidFill>
+                  <a:prstDash val="solid"/>
+                </a:ln>
+                <a:solidFill>
+                  <a:schemeClr val="bg2">
+                    <a:tint val="85000"/>
+                    <a:satMod val="155000"/>
+                  </a:schemeClr>
+                </a:solidFill>
+                <a:effectLst>
+                  <a:outerShdw blurRad="41275" dist="20320" dir="1800000" algn="tl" rotWithShape="0">
+                    <a:srgbClr val="000000">
+                      <a:alpha val="40000"/>
+                    </a:srgbClr>
+                  </a:outerShdw>
+                </a:effectLst>
+              </a:rPr>
+              <a:t>Parents</a:t>
+            </a:r>
+            <a:r>
+              <a:rPr lang="de-DE" sz="3600" b="1" dirty="0" smtClean="0">
+                <a:ln w="12700">
+                  <a:solidFill>
+                    <a:schemeClr val="tx2">
+                      <a:satMod val="155000"/>
+                    </a:schemeClr>
+                  </a:solidFill>
+                  <a:prstDash val="solid"/>
+                </a:ln>
+                <a:solidFill>
+                  <a:schemeClr val="bg2">
+                    <a:tint val="85000"/>
+                    <a:satMod val="155000"/>
+                  </a:schemeClr>
+                </a:solidFill>
+                <a:effectLst>
+                  <a:outerShdw blurRad="41275" dist="20320" dir="1800000" algn="tl" rotWithShape="0">
+                    <a:srgbClr val="000000">
+                      <a:alpha val="40000"/>
+                    </a:srgbClr>
+                  </a:outerShdw>
+                </a:effectLst>
+              </a:rPr>
+              <a:t>-App</a:t>
+            </a:r>
+            <a:endParaRPr lang="de-DE" sz="3600" b="1" dirty="0">
+              <a:ln w="12700">
+                <a:solidFill>
+                  <a:schemeClr val="tx2">
+                    <a:satMod val="155000"/>
+                  </a:schemeClr>
+                </a:solidFill>
+                <a:prstDash val="solid"/>
+              </a:ln>
+              <a:solidFill>
+                <a:schemeClr val="bg2">
+                  <a:tint val="85000"/>
+                  <a:satMod val="155000"/>
+                </a:schemeClr>
+              </a:solidFill>
+              <a:effectLst>
+                <a:outerShdw blurRad="41275" dist="20320" dir="1800000" algn="tl" rotWithShape="0">
+                  <a:srgbClr val="000000">
+                    <a:alpha val="40000"/>
+                  </a:srgbClr>
+                </a:outerShdw>
+              </a:effectLst>
+            </a:endParaRPr>
           </a:p>
         </p:txBody>
       </p:sp>
     </p:spTree>
     <p:extLst>
       <p:ext uri="{BB962C8B-B14F-4D97-AF65-F5344CB8AC3E}">
-        <p14:creationId xmlns:p14="http://schemas.microsoft.com/office/powerpoint/2010/main" val="857423768"/>
+        <p14:creationId xmlns:p14="http://schemas.microsoft.com/office/powerpoint/2010/main" val="3256619057"/>
       </p:ext>
     </p:extLst>
   </p:cSld>
@@ -4105,84 +4220,107 @@
           <a:lstStyle/>
           <a:p>
             <a:r>
-              <a:rPr lang="de-DE" dirty="0" err="1" smtClean="0"/>
-              <a:t>Xamarin</a:t>
+              <a:rPr lang="de-DE" dirty="0" smtClean="0"/>
+              <a:t>Hydra</a:t>
+            </a:r>
+          </a:p>
+          <a:p>
+            <a:pPr lvl="1"/>
+            <a:r>
+              <a:rPr lang="de-DE" dirty="0" smtClean="0"/>
+              <a:t>Pro:</a:t>
+            </a:r>
+          </a:p>
+          <a:p>
+            <a:pPr lvl="2"/>
+            <a:r>
+              <a:rPr lang="de-DE" dirty="0" err="1" smtClean="0"/>
+              <a:t>Unity</a:t>
+            </a:r>
+            <a:r>
+              <a:rPr lang="de-DE" dirty="0" smtClean="0"/>
+              <a:t> SDK für </a:t>
+            </a:r>
+            <a:r>
+              <a:rPr lang="de-DE" dirty="0" err="1" smtClean="0"/>
+              <a:t>iOS</a:t>
+            </a:r>
+            <a:r>
+              <a:rPr lang="de-DE" dirty="0" smtClean="0"/>
+              <a:t> &amp; </a:t>
+            </a:r>
+            <a:r>
+              <a:rPr lang="de-DE" dirty="0" err="1" smtClean="0"/>
+              <a:t>Android</a:t>
             </a:r>
             <a:endParaRPr lang="de-DE" dirty="0" smtClean="0"/>
           </a:p>
           <a:p>
+            <a:pPr lvl="2"/>
+            <a:r>
+              <a:rPr lang="de-DE" dirty="0" smtClean="0"/>
+              <a:t>Push-</a:t>
+            </a:r>
+            <a:r>
+              <a:rPr lang="de-DE" dirty="0" err="1" smtClean="0"/>
+              <a:t>Notifications</a:t>
+            </a:r>
+            <a:r>
+              <a:rPr lang="de-DE" dirty="0" smtClean="0"/>
+              <a:t>, Broadcasts,</a:t>
+            </a:r>
+          </a:p>
+          <a:p>
+            <a:pPr lvl="2"/>
+            <a:r>
+              <a:rPr lang="de-DE" dirty="0" smtClean="0"/>
+              <a:t>Match-Making</a:t>
+            </a:r>
+          </a:p>
+          <a:p>
+            <a:pPr lvl="2"/>
+            <a:r>
+              <a:rPr lang="de-DE" dirty="0" err="1" smtClean="0"/>
+              <a:t>Stats</a:t>
+            </a:r>
+            <a:r>
+              <a:rPr lang="de-DE" dirty="0" smtClean="0"/>
+              <a:t>, </a:t>
+            </a:r>
+            <a:r>
+              <a:rPr lang="de-DE" dirty="0" err="1" smtClean="0"/>
+              <a:t>Leaderboard</a:t>
+            </a:r>
+            <a:r>
+              <a:rPr lang="de-DE" dirty="0" smtClean="0"/>
+              <a:t>, </a:t>
+            </a:r>
+            <a:r>
+              <a:rPr lang="de-DE" dirty="0" err="1" smtClean="0"/>
+              <a:t>Achievements</a:t>
+            </a:r>
+            <a:endParaRPr lang="de-DE" dirty="0" smtClean="0"/>
+          </a:p>
+          <a:p>
             <a:pPr lvl="1"/>
             <a:r>
               <a:rPr lang="de-DE" dirty="0" smtClean="0"/>
-              <a:t>Pro:</a:t>
+              <a:t>Con:</a:t>
             </a:r>
           </a:p>
           <a:p>
             <a:pPr lvl="2"/>
             <a:r>
               <a:rPr lang="de-DE" dirty="0" smtClean="0"/>
-              <a:t>Hilfreich für Cross-</a:t>
-            </a:r>
-            <a:r>
-              <a:rPr lang="de-DE" dirty="0" err="1" smtClean="0"/>
-              <a:t>Platform</a:t>
-            </a:r>
-            <a:r>
-              <a:rPr lang="de-DE" dirty="0" smtClean="0"/>
-              <a:t> </a:t>
-            </a:r>
-            <a:r>
-              <a:rPr lang="de-DE" dirty="0" err="1" smtClean="0"/>
-              <a:t>Parents</a:t>
-            </a:r>
-            <a:r>
-              <a:rPr lang="de-DE" dirty="0" smtClean="0"/>
-              <a:t>-App</a:t>
-            </a:r>
-          </a:p>
-          <a:p>
-            <a:pPr lvl="2"/>
-            <a:r>
-              <a:rPr lang="de-DE" dirty="0" smtClean="0"/>
-              <a:t>Parse </a:t>
-            </a:r>
-            <a:r>
-              <a:rPr lang="de-DE" dirty="0" smtClean="0"/>
-              <a:t>SDK für Push </a:t>
+              <a:t>Push-</a:t>
             </a:r>
             <a:r>
               <a:rPr lang="de-DE" dirty="0" err="1" smtClean="0"/>
               <a:t>Notifications</a:t>
             </a:r>
-            <a:endParaRPr lang="de-DE" dirty="0" smtClean="0"/>
-          </a:p>
-          <a:p>
-            <a:pPr lvl="2"/>
-            <a:r>
-              <a:rPr lang="de-DE" dirty="0" smtClean="0"/>
-              <a:t>Kostenlose Version verwendbar</a:t>
-            </a:r>
-          </a:p>
-          <a:p>
-            <a:pPr lvl="1"/>
-            <a:r>
-              <a:rPr lang="de-DE" dirty="0" smtClean="0"/>
-              <a:t>Con:</a:t>
-            </a:r>
-          </a:p>
-          <a:p>
-            <a:pPr lvl="2"/>
-            <a:r>
-              <a:rPr lang="de-DE" dirty="0" smtClean="0"/>
-              <a:t>Cross-</a:t>
-            </a:r>
-            <a:r>
-              <a:rPr lang="de-DE" dirty="0" err="1" smtClean="0"/>
-              <a:t>Platform</a:t>
-            </a:r>
-            <a:r>
-              <a:rPr lang="de-DE" dirty="0" smtClean="0"/>
-              <a:t> Projekt schwierig aufzusetzen</a:t>
+            <a:r>
+              <a:rPr lang="de-DE" dirty="0" smtClean="0"/>
+              <a:t> in API noch nicht gefunden</a:t>
             </a:r>
           </a:p>
           <a:p>
@@ -4232,400 +4370,6 @@
             <a:fld id="{2E18F249-BDE3-A64A-9BF3-08DB2E7D85BD}" type="slidenum">
               <a:rPr lang="de-DE" smtClean="0"/>
               <a:t>11</a:t>
-            </a:fld>
-            <a:endParaRPr lang="de-DE"/>
-          </a:p>
-        </p:txBody>
-      </p:sp>
-      <p:pic>
-        <p:nvPicPr>
-          <p:cNvPr id="4" name="Bild 3"/>
-          <p:cNvPicPr>
-            <a:picLocks noChangeAspect="1"/>
-          </p:cNvPicPr>
-          <p:nvPr/>
-        </p:nvPicPr>
-        <p:blipFill>
-          <a:blip r:embed="rId2"/>
-          <a:stretch>
-            <a:fillRect/>
-          </a:stretch>
-        </p:blipFill>
-        <p:spPr>
-          <a:xfrm>
-            <a:off x="2704207" y="1417638"/>
-            <a:ext cx="1053098" cy="1053098"/>
-          </a:xfrm>
-          <a:prstGeom prst="rect">
-            <a:avLst/>
-          </a:prstGeom>
-        </p:spPr>
-      </p:pic>
-      <p:sp>
-        <p:nvSpPr>
-          <p:cNvPr id="8" name="Textfeld 7"/>
-          <p:cNvSpPr txBox="1"/>
-          <p:nvPr/>
-        </p:nvSpPr>
-        <p:spPr>
-          <a:xfrm>
-            <a:off x="457200" y="5164126"/>
-            <a:ext cx="8085946" cy="646331"/>
-          </a:xfrm>
-          <a:prstGeom prst="rect">
-            <a:avLst/>
-          </a:prstGeom>
-          <a:noFill/>
-        </p:spPr>
-        <p:txBody>
-          <a:bodyPr wrap="square" rtlCol="0">
-            <a:spAutoFit/>
-          </a:bodyPr>
-          <a:lstStyle/>
-          <a:p>
-            <a:r>
-              <a:rPr lang="de-DE" sz="3600" b="1" dirty="0" smtClean="0">
-                <a:ln w="12700">
-                  <a:solidFill>
-                    <a:schemeClr val="tx2">
-                      <a:satMod val="155000"/>
-                    </a:schemeClr>
-                  </a:solidFill>
-                  <a:prstDash val="solid"/>
-                </a:ln>
-                <a:solidFill>
-                  <a:schemeClr val="bg2">
-                    <a:tint val="85000"/>
-                    <a:satMod val="155000"/>
-                  </a:schemeClr>
-                </a:solidFill>
-                <a:effectLst>
-                  <a:outerShdw blurRad="41275" dist="20320" dir="1800000" algn="tl" rotWithShape="0">
-                    <a:srgbClr val="000000">
-                      <a:alpha val="40000"/>
-                    </a:srgbClr>
-                  </a:outerShdw>
-                </a:effectLst>
-              </a:rPr>
-              <a:t>1. Wahl für Entwicklung der </a:t>
-            </a:r>
-            <a:r>
-              <a:rPr lang="de-DE" sz="3600" b="1" dirty="0" err="1" smtClean="0">
-                <a:ln w="12700">
-                  <a:solidFill>
-                    <a:schemeClr val="tx2">
-                      <a:satMod val="155000"/>
-                    </a:schemeClr>
-                  </a:solidFill>
-                  <a:prstDash val="solid"/>
-                </a:ln>
-                <a:solidFill>
-                  <a:schemeClr val="bg2">
-                    <a:tint val="85000"/>
-                    <a:satMod val="155000"/>
-                  </a:schemeClr>
-                </a:solidFill>
-                <a:effectLst>
-                  <a:outerShdw blurRad="41275" dist="20320" dir="1800000" algn="tl" rotWithShape="0">
-                    <a:srgbClr val="000000">
-                      <a:alpha val="40000"/>
-                    </a:srgbClr>
-                  </a:outerShdw>
-                </a:effectLst>
-              </a:rPr>
-              <a:t>Parents</a:t>
-            </a:r>
-            <a:r>
-              <a:rPr lang="de-DE" sz="3600" b="1" dirty="0" smtClean="0">
-                <a:ln w="12700">
-                  <a:solidFill>
-                    <a:schemeClr val="tx2">
-                      <a:satMod val="155000"/>
-                    </a:schemeClr>
-                  </a:solidFill>
-                  <a:prstDash val="solid"/>
-                </a:ln>
-                <a:solidFill>
-                  <a:schemeClr val="bg2">
-                    <a:tint val="85000"/>
-                    <a:satMod val="155000"/>
-                  </a:schemeClr>
-                </a:solidFill>
-                <a:effectLst>
-                  <a:outerShdw blurRad="41275" dist="20320" dir="1800000" algn="tl" rotWithShape="0">
-                    <a:srgbClr val="000000">
-                      <a:alpha val="40000"/>
-                    </a:srgbClr>
-                  </a:outerShdw>
-                </a:effectLst>
-              </a:rPr>
-              <a:t>-App</a:t>
-            </a:r>
-            <a:endParaRPr lang="de-DE" sz="3600" b="1" dirty="0">
-              <a:ln w="12700">
-                <a:solidFill>
-                  <a:schemeClr val="tx2">
-                    <a:satMod val="155000"/>
-                  </a:schemeClr>
-                </a:solidFill>
-                <a:prstDash val="solid"/>
-              </a:ln>
-              <a:solidFill>
-                <a:schemeClr val="bg2">
-                  <a:tint val="85000"/>
-                  <a:satMod val="155000"/>
-                </a:schemeClr>
-              </a:solidFill>
-              <a:effectLst>
-                <a:outerShdw blurRad="41275" dist="20320" dir="1800000" algn="tl" rotWithShape="0">
-                  <a:srgbClr val="000000">
-                    <a:alpha val="40000"/>
-                  </a:srgbClr>
-                </a:outerShdw>
-              </a:effectLst>
-            </a:endParaRPr>
-          </a:p>
-        </p:txBody>
-      </p:sp>
-    </p:spTree>
-    <p:extLst>
-      <p:ext uri="{BB962C8B-B14F-4D97-AF65-F5344CB8AC3E}">
-        <p14:creationId xmlns:p14="http://schemas.microsoft.com/office/powerpoint/2010/main" val="3256619057"/>
-      </p:ext>
-    </p:extLst>
-  </p:cSld>
-  <p:clrMapOvr>
-    <a:masterClrMapping/>
-  </p:clrMapOvr>
-</p:sld>
-</file>
-
-<file path=ppt/slides/slide12.xml><?xml version="1.0" encoding="utf-8"?>
-<p:sld xmlns:a="http://schemas.openxmlformats.org/drawingml/2006/main" xmlns:r="http://schemas.openxmlformats.org/officeDocument/2006/relationships" xmlns:p="http://schemas.openxmlformats.org/presentationml/2006/main">
-  <p:cSld>
-    <p:spTree>
-      <p:nvGrpSpPr>
-        <p:cNvPr id="1" name=""/>
-        <p:cNvGrpSpPr/>
-        <p:nvPr/>
-      </p:nvGrpSpPr>
-      <p:grpSpPr>
-        <a:xfrm>
-          <a:off x="0" y="0"/>
-          <a:ext cx="0" cy="0"/>
-          <a:chOff x="0" y="0"/>
-          <a:chExt cx="0" cy="0"/>
-        </a:xfrm>
-      </p:grpSpPr>
-      <p:sp>
-        <p:nvSpPr>
-          <p:cNvPr id="2" name="Titel 1"/>
-          <p:cNvSpPr>
-            <a:spLocks noGrp="1"/>
-          </p:cNvSpPr>
-          <p:nvPr>
-            <p:ph type="title"/>
-          </p:nvPr>
-        </p:nvSpPr>
-        <p:spPr/>
-        <p:txBody>
-          <a:bodyPr/>
-          <a:lstStyle/>
-          <a:p>
-            <a:r>
-              <a:rPr lang="de-DE" dirty="0" smtClean="0"/>
-              <a:t>Cross </a:t>
-            </a:r>
-            <a:r>
-              <a:rPr lang="de-DE" dirty="0" err="1" smtClean="0"/>
-              <a:t>Notifications</a:t>
-            </a:r>
-            <a:r>
-              <a:rPr lang="de-DE" dirty="0" smtClean="0"/>
-              <a:t> in </a:t>
-            </a:r>
-            <a:r>
-              <a:rPr lang="de-DE" dirty="0" err="1" smtClean="0"/>
-              <a:t>Unity</a:t>
-            </a:r>
-            <a:endParaRPr lang="de-DE" dirty="0"/>
-          </a:p>
-        </p:txBody>
-      </p:sp>
-      <p:sp>
-        <p:nvSpPr>
-          <p:cNvPr id="3" name="Inhaltsplatzhalter 2"/>
-          <p:cNvSpPr>
-            <a:spLocks noGrp="1"/>
-          </p:cNvSpPr>
-          <p:nvPr>
-            <p:ph idx="1"/>
-          </p:nvPr>
-        </p:nvSpPr>
-        <p:spPr/>
-        <p:txBody>
-          <a:bodyPr>
-            <a:normAutofit/>
-          </a:bodyPr>
-          <a:lstStyle/>
-          <a:p>
-            <a:r>
-              <a:rPr lang="de-DE" dirty="0" smtClean="0"/>
-              <a:t>Hydra</a:t>
-            </a:r>
-            <a:endParaRPr lang="de-DE" dirty="0" smtClean="0"/>
-          </a:p>
-          <a:p>
-            <a:pPr lvl="1"/>
-            <a:r>
-              <a:rPr lang="de-DE" dirty="0" smtClean="0"/>
-              <a:t>Pro:</a:t>
-            </a:r>
-          </a:p>
-          <a:p>
-            <a:pPr lvl="2"/>
-            <a:r>
-              <a:rPr lang="de-DE" dirty="0" err="1" smtClean="0"/>
-              <a:t>Unity</a:t>
-            </a:r>
-            <a:r>
-              <a:rPr lang="de-DE" dirty="0" smtClean="0"/>
-              <a:t> SDK für </a:t>
-            </a:r>
-            <a:r>
-              <a:rPr lang="de-DE" dirty="0" err="1" smtClean="0"/>
-              <a:t>iOS</a:t>
-            </a:r>
-            <a:r>
-              <a:rPr lang="de-DE" dirty="0" smtClean="0"/>
-              <a:t> &amp; </a:t>
-            </a:r>
-            <a:r>
-              <a:rPr lang="de-DE" dirty="0" err="1" smtClean="0"/>
-              <a:t>Android</a:t>
-            </a:r>
-            <a:endParaRPr lang="de-DE" dirty="0" smtClean="0"/>
-          </a:p>
-          <a:p>
-            <a:pPr lvl="2"/>
-            <a:r>
-              <a:rPr lang="de-DE" dirty="0" smtClean="0"/>
-              <a:t>Push-</a:t>
-            </a:r>
-            <a:r>
-              <a:rPr lang="de-DE" dirty="0" err="1" smtClean="0"/>
-              <a:t>Notifications</a:t>
-            </a:r>
-            <a:r>
-              <a:rPr lang="de-DE" dirty="0" smtClean="0"/>
-              <a:t>, Broadcasts,</a:t>
-            </a:r>
-          </a:p>
-          <a:p>
-            <a:pPr lvl="2"/>
-            <a:r>
-              <a:rPr lang="de-DE" dirty="0" smtClean="0"/>
-              <a:t>Match-Making</a:t>
-            </a:r>
-          </a:p>
-          <a:p>
-            <a:pPr lvl="2"/>
-            <a:r>
-              <a:rPr lang="de-DE" dirty="0" err="1" smtClean="0"/>
-              <a:t>Stats</a:t>
-            </a:r>
-            <a:r>
-              <a:rPr lang="de-DE" dirty="0" smtClean="0"/>
-              <a:t>, </a:t>
-            </a:r>
-            <a:r>
-              <a:rPr lang="de-DE" dirty="0" err="1" smtClean="0"/>
-              <a:t>Leaderboard</a:t>
-            </a:r>
-            <a:r>
-              <a:rPr lang="de-DE" dirty="0" smtClean="0"/>
-              <a:t>, </a:t>
-            </a:r>
-            <a:r>
-              <a:rPr lang="de-DE" dirty="0" err="1" smtClean="0"/>
-              <a:t>Achievements</a:t>
-            </a:r>
-            <a:endParaRPr lang="de-DE" dirty="0" smtClean="0"/>
-          </a:p>
-          <a:p>
-            <a:pPr lvl="1"/>
-            <a:r>
-              <a:rPr lang="de-DE" dirty="0" smtClean="0"/>
-              <a:t>Con</a:t>
-            </a:r>
-            <a:r>
-              <a:rPr lang="de-DE" dirty="0" smtClean="0"/>
-              <a:t>:</a:t>
-            </a:r>
-          </a:p>
-          <a:p>
-            <a:pPr lvl="2"/>
-            <a:r>
-              <a:rPr lang="de-DE" dirty="0" smtClean="0"/>
-              <a:t>Push-</a:t>
-            </a:r>
-            <a:r>
-              <a:rPr lang="de-DE" dirty="0" err="1" smtClean="0"/>
-              <a:t>Notifications</a:t>
-            </a:r>
-            <a:r>
-              <a:rPr lang="de-DE" dirty="0" smtClean="0"/>
-              <a:t> in API noch nicht gefunden</a:t>
-            </a:r>
-            <a:endParaRPr lang="de-DE" dirty="0" smtClean="0"/>
-          </a:p>
-          <a:p>
-            <a:pPr lvl="2"/>
-            <a:endParaRPr lang="de-DE" dirty="0" smtClean="0"/>
-          </a:p>
-        </p:txBody>
-      </p:sp>
-      <p:sp>
-        <p:nvSpPr>
-          <p:cNvPr id="6" name="Fußzeilenplatzhalter 5"/>
-          <p:cNvSpPr>
-            <a:spLocks noGrp="1"/>
-          </p:cNvSpPr>
-          <p:nvPr>
-            <p:ph type="ftr" sz="quarter" idx="11"/>
-          </p:nvPr>
-        </p:nvSpPr>
-        <p:spPr/>
-        <p:txBody>
-          <a:bodyPr/>
-          <a:lstStyle/>
-          <a:p>
-            <a:r>
-              <a:rPr lang="de-DE" smtClean="0"/>
-              <a:t>Aquatic Space - Back End</a:t>
-            </a:r>
-            <a:endParaRPr lang="de-DE"/>
-          </a:p>
-        </p:txBody>
-      </p:sp>
-      <p:sp>
-        <p:nvSpPr>
-          <p:cNvPr id="7" name="Foliennummernplatzhalter 6"/>
-          <p:cNvSpPr>
-            <a:spLocks noGrp="1"/>
-          </p:cNvSpPr>
-          <p:nvPr>
-            <p:ph type="sldNum" sz="quarter" idx="12"/>
-          </p:nvPr>
-        </p:nvSpPr>
-        <p:spPr/>
-        <p:txBody>
-          <a:bodyPr/>
-          <a:lstStyle/>
-          <a:p>
-            <a:fld id="{2E18F249-BDE3-A64A-9BF3-08DB2E7D85BD}" type="slidenum">
-              <a:rPr lang="de-DE" smtClean="0"/>
-              <a:t>12</a:t>
             </a:fld>
             <a:endParaRPr lang="de-DE"/>
           </a:p>
@@ -4677,33 +4421,7 @@
                   </a:outerShdw>
                 </a:effectLst>
               </a:rPr>
-              <a:t>1. Wahl für </a:t>
-            </a:r>
-            <a:r>
-              <a:rPr lang="de-DE" sz="2800" b="1" dirty="0" smtClean="0">
-                <a:ln w="12700">
-                  <a:solidFill>
-                    <a:schemeClr val="tx2">
-                      <a:satMod val="155000"/>
-                    </a:schemeClr>
-                  </a:solidFill>
-                  <a:prstDash val="solid"/>
-                </a:ln>
-                <a:solidFill>
-                  <a:schemeClr val="bg2">
-                    <a:tint val="85000"/>
-                    <a:satMod val="155000"/>
-                  </a:schemeClr>
-                </a:solidFill>
-                <a:effectLst>
-                  <a:outerShdw blurRad="41275" dist="20320" dir="1800000" algn="tl" rotWithShape="0">
-                    <a:srgbClr val="000000">
-                      <a:alpha val="40000"/>
-                    </a:srgbClr>
-                  </a:outerShdw>
-                </a:effectLst>
-              </a:rPr>
-              <a:t>Client-Back-End Handling im Spiel, mit </a:t>
+              <a:t>1. Wahl für Client-Back-End Handling im Spiel, mit </a:t>
             </a:r>
             <a:r>
               <a:rPr lang="de-DE" sz="2800" b="1" dirty="0" err="1" smtClean="0">
@@ -4820,6 +4538,763 @@
 </p:sld>
 </file>
 
+<file path=ppt/slides/slide12.xml><?xml version="1.0" encoding="utf-8"?>
+<p:sld xmlns:a="http://schemas.openxmlformats.org/drawingml/2006/main" xmlns:r="http://schemas.openxmlformats.org/officeDocument/2006/relationships" xmlns:p="http://schemas.openxmlformats.org/presentationml/2006/main">
+  <p:cSld>
+    <p:spTree>
+      <p:nvGrpSpPr>
+        <p:cNvPr id="1" name=""/>
+        <p:cNvGrpSpPr/>
+        <p:nvPr/>
+      </p:nvGrpSpPr>
+      <p:grpSpPr>
+        <a:xfrm>
+          <a:off x="0" y="0"/>
+          <a:ext cx="0" cy="0"/>
+          <a:chOff x="0" y="0"/>
+          <a:chExt cx="0" cy="0"/>
+        </a:xfrm>
+      </p:grpSpPr>
+      <p:sp>
+        <p:nvSpPr>
+          <p:cNvPr id="2" name="Titel 1"/>
+          <p:cNvSpPr>
+            <a:spLocks noGrp="1"/>
+          </p:cNvSpPr>
+          <p:nvPr>
+            <p:ph type="title"/>
+          </p:nvPr>
+        </p:nvSpPr>
+        <p:spPr/>
+        <p:txBody>
+          <a:bodyPr/>
+          <a:lstStyle/>
+          <a:p>
+            <a:r>
+              <a:rPr lang="de-DE" dirty="0" smtClean="0"/>
+              <a:t>Cross </a:t>
+            </a:r>
+            <a:r>
+              <a:rPr lang="de-DE" dirty="0" err="1" smtClean="0"/>
+              <a:t>Notifications</a:t>
+            </a:r>
+            <a:r>
+              <a:rPr lang="de-DE" dirty="0" smtClean="0"/>
+              <a:t> in </a:t>
+            </a:r>
+            <a:r>
+              <a:rPr lang="de-DE" dirty="0" err="1" smtClean="0"/>
+              <a:t>Unity</a:t>
+            </a:r>
+            <a:endParaRPr lang="de-DE" dirty="0"/>
+          </a:p>
+        </p:txBody>
+      </p:sp>
+      <p:sp>
+        <p:nvSpPr>
+          <p:cNvPr id="3" name="Inhaltsplatzhalter 2"/>
+          <p:cNvSpPr>
+            <a:spLocks noGrp="1"/>
+          </p:cNvSpPr>
+          <p:nvPr>
+            <p:ph idx="1"/>
+          </p:nvPr>
+        </p:nvSpPr>
+        <p:spPr/>
+        <p:txBody>
+          <a:bodyPr>
+            <a:normAutofit lnSpcReduction="10000"/>
+          </a:bodyPr>
+          <a:lstStyle/>
+          <a:p>
+            <a:pPr marL="514350" indent="-457200"/>
+            <a:r>
+              <a:rPr lang="de-DE" dirty="0"/>
+              <a:t>Easy Cross-</a:t>
+            </a:r>
+            <a:r>
+              <a:rPr lang="de-DE" dirty="0" err="1"/>
+              <a:t>Platform</a:t>
+            </a:r>
+            <a:r>
+              <a:rPr lang="de-DE" dirty="0"/>
+              <a:t> </a:t>
+            </a:r>
+            <a:r>
+              <a:rPr lang="de-DE" dirty="0" err="1"/>
+              <a:t>Notifications</a:t>
+            </a:r>
+            <a:r>
+              <a:rPr lang="de-DE" dirty="0"/>
+              <a:t> </a:t>
+            </a:r>
+            <a:r>
+              <a:rPr lang="de-DE" dirty="0" err="1" smtClean="0"/>
+              <a:t>Plugin</a:t>
+            </a:r>
+            <a:endParaRPr lang="de-DE" dirty="0"/>
+          </a:p>
+          <a:p>
+            <a:pPr lvl="1"/>
+            <a:r>
+              <a:rPr lang="de-DE" dirty="0" smtClean="0"/>
+              <a:t>Pro:</a:t>
+            </a:r>
+          </a:p>
+          <a:p>
+            <a:pPr lvl="2"/>
+            <a:r>
+              <a:rPr lang="de-DE" dirty="0" smtClean="0"/>
+              <a:t>SDK für </a:t>
+            </a:r>
+            <a:r>
+              <a:rPr lang="de-DE" dirty="0" err="1" smtClean="0"/>
+              <a:t>iOS</a:t>
+            </a:r>
+            <a:r>
+              <a:rPr lang="de-DE" dirty="0" smtClean="0"/>
+              <a:t> &amp; </a:t>
+            </a:r>
+            <a:r>
+              <a:rPr lang="de-DE" dirty="0" err="1" smtClean="0"/>
+              <a:t>Android</a:t>
+            </a:r>
+            <a:r>
+              <a:rPr lang="de-DE" dirty="0" smtClean="0"/>
+              <a:t> Push </a:t>
+            </a:r>
+            <a:r>
+              <a:rPr lang="de-DE" dirty="0" err="1" smtClean="0"/>
+              <a:t>Notification</a:t>
+            </a:r>
+            <a:r>
+              <a:rPr lang="de-DE" dirty="0" smtClean="0"/>
+              <a:t> </a:t>
+            </a:r>
+            <a:r>
+              <a:rPr lang="de-DE" dirty="0" smtClean="0"/>
+              <a:t>Empfang</a:t>
+            </a:r>
+          </a:p>
+          <a:p>
+            <a:pPr lvl="2"/>
+            <a:r>
+              <a:rPr lang="de-DE" dirty="0" smtClean="0"/>
+              <a:t>Server-seitige anpassbar</a:t>
+            </a:r>
+            <a:endParaRPr lang="de-DE" dirty="0" smtClean="0"/>
+          </a:p>
+          <a:p>
+            <a:pPr lvl="2"/>
+            <a:r>
+              <a:rPr lang="de-DE" dirty="0" smtClean="0"/>
+              <a:t>Inklusive allem Source-Code</a:t>
+            </a:r>
+            <a:endParaRPr lang="de-DE" dirty="0" smtClean="0"/>
+          </a:p>
+          <a:p>
+            <a:pPr lvl="2"/>
+            <a:r>
+              <a:rPr lang="de-DE" dirty="0" smtClean="0"/>
+              <a:t>Einmalig 40€</a:t>
+            </a:r>
+          </a:p>
+          <a:p>
+            <a:pPr lvl="1"/>
+            <a:r>
+              <a:rPr lang="de-DE" dirty="0" smtClean="0"/>
+              <a:t>Con:</a:t>
+            </a:r>
+          </a:p>
+          <a:p>
+            <a:pPr lvl="2"/>
+            <a:r>
+              <a:rPr lang="de-DE" dirty="0"/>
+              <a:t>Keine kostenlose Testversion</a:t>
+            </a:r>
+          </a:p>
+          <a:p>
+            <a:pPr lvl="2"/>
+            <a:r>
+              <a:rPr lang="de-DE" dirty="0" smtClean="0"/>
+              <a:t>Eigener Server notwendig</a:t>
+            </a:r>
+          </a:p>
+          <a:p>
+            <a:pPr lvl="2"/>
+            <a:r>
+              <a:rPr lang="de-DE" dirty="0" smtClean="0"/>
+              <a:t>Aufwand für Set-</a:t>
+            </a:r>
+            <a:r>
+              <a:rPr lang="de-DE" dirty="0" err="1" smtClean="0"/>
+              <a:t>Up</a:t>
+            </a:r>
+            <a:r>
+              <a:rPr lang="de-DE" dirty="0" smtClean="0"/>
+              <a:t> und Anpassungen</a:t>
+            </a:r>
+            <a:endParaRPr lang="de-DE" dirty="0" smtClean="0"/>
+          </a:p>
+        </p:txBody>
+      </p:sp>
+      <p:sp>
+        <p:nvSpPr>
+          <p:cNvPr id="6" name="Fußzeilenplatzhalter 5"/>
+          <p:cNvSpPr>
+            <a:spLocks noGrp="1"/>
+          </p:cNvSpPr>
+          <p:nvPr>
+            <p:ph type="ftr" sz="quarter" idx="11"/>
+          </p:nvPr>
+        </p:nvSpPr>
+        <p:spPr/>
+        <p:txBody>
+          <a:bodyPr/>
+          <a:lstStyle/>
+          <a:p>
+            <a:r>
+              <a:rPr lang="de-DE" smtClean="0"/>
+              <a:t>Aquatic Space - Back End</a:t>
+            </a:r>
+            <a:endParaRPr lang="de-DE"/>
+          </a:p>
+        </p:txBody>
+      </p:sp>
+      <p:sp>
+        <p:nvSpPr>
+          <p:cNvPr id="7" name="Foliennummernplatzhalter 6"/>
+          <p:cNvSpPr>
+            <a:spLocks noGrp="1"/>
+          </p:cNvSpPr>
+          <p:nvPr>
+            <p:ph type="sldNum" sz="quarter" idx="12"/>
+          </p:nvPr>
+        </p:nvSpPr>
+        <p:spPr/>
+        <p:txBody>
+          <a:bodyPr/>
+          <a:lstStyle/>
+          <a:p>
+            <a:fld id="{2E18F249-BDE3-A64A-9BF3-08DB2E7D85BD}" type="slidenum">
+              <a:rPr lang="de-DE" smtClean="0"/>
+              <a:t>12</a:t>
+            </a:fld>
+            <a:endParaRPr lang="de-DE"/>
+          </a:p>
+        </p:txBody>
+      </p:sp>
+      <p:sp>
+        <p:nvSpPr>
+          <p:cNvPr id="8" name="Textfeld 7"/>
+          <p:cNvSpPr txBox="1"/>
+          <p:nvPr/>
+        </p:nvSpPr>
+        <p:spPr>
+          <a:xfrm>
+            <a:off x="600854" y="5864553"/>
+            <a:ext cx="8085946" cy="523220"/>
+          </a:xfrm>
+          <a:prstGeom prst="rect">
+            <a:avLst/>
+          </a:prstGeom>
+          <a:noFill/>
+        </p:spPr>
+        <p:txBody>
+          <a:bodyPr wrap="square" rtlCol="0">
+            <a:spAutoFit/>
+          </a:bodyPr>
+          <a:lstStyle/>
+          <a:p>
+            <a:r>
+              <a:rPr lang="de-DE" sz="2800" b="1" dirty="0" smtClean="0">
+                <a:ln w="12700">
+                  <a:solidFill>
+                    <a:schemeClr val="tx2">
+                      <a:satMod val="155000"/>
+                    </a:schemeClr>
+                  </a:solidFill>
+                  <a:prstDash val="solid"/>
+                </a:ln>
+                <a:solidFill>
+                  <a:schemeClr val="bg2">
+                    <a:tint val="85000"/>
+                    <a:satMod val="155000"/>
+                  </a:schemeClr>
+                </a:solidFill>
+                <a:effectLst>
+                  <a:outerShdw blurRad="41275" dist="20320" dir="1800000" algn="tl" rotWithShape="0">
+                    <a:srgbClr val="000000">
+                      <a:alpha val="40000"/>
+                    </a:srgbClr>
+                  </a:outerShdw>
+                </a:effectLst>
+              </a:rPr>
+              <a:t>1. Wahl für </a:t>
+            </a:r>
+            <a:r>
+              <a:rPr lang="de-DE" sz="2800" b="1" dirty="0" smtClean="0">
+                <a:ln w="12700">
+                  <a:solidFill>
+                    <a:schemeClr val="tx2">
+                      <a:satMod val="155000"/>
+                    </a:schemeClr>
+                  </a:solidFill>
+                  <a:prstDash val="solid"/>
+                </a:ln>
+                <a:solidFill>
+                  <a:schemeClr val="bg2">
+                    <a:tint val="85000"/>
+                    <a:satMod val="155000"/>
+                  </a:schemeClr>
+                </a:solidFill>
+                <a:effectLst>
+                  <a:outerShdw blurRad="41275" dist="20320" dir="1800000" algn="tl" rotWithShape="0">
+                    <a:srgbClr val="000000">
+                      <a:alpha val="40000"/>
+                    </a:srgbClr>
+                  </a:outerShdw>
+                </a:effectLst>
+              </a:rPr>
+              <a:t>kostengünstige Allround-Lösung</a:t>
+            </a:r>
+            <a:endParaRPr lang="de-DE" sz="2800" b="1" dirty="0">
+              <a:ln w="12700">
+                <a:solidFill>
+                  <a:schemeClr val="tx2">
+                    <a:satMod val="155000"/>
+                  </a:schemeClr>
+                </a:solidFill>
+                <a:prstDash val="solid"/>
+              </a:ln>
+              <a:solidFill>
+                <a:schemeClr val="bg2">
+                  <a:tint val="85000"/>
+                  <a:satMod val="155000"/>
+                </a:schemeClr>
+              </a:solidFill>
+              <a:effectLst>
+                <a:outerShdw blurRad="41275" dist="20320" dir="1800000" algn="tl" rotWithShape="0">
+                  <a:srgbClr val="000000">
+                    <a:alpha val="40000"/>
+                  </a:srgbClr>
+                </a:outerShdw>
+              </a:effectLst>
+            </a:endParaRPr>
+          </a:p>
+        </p:txBody>
+      </p:sp>
+    </p:spTree>
+    <p:extLst>
+      <p:ext uri="{BB962C8B-B14F-4D97-AF65-F5344CB8AC3E}">
+        <p14:creationId xmlns:p14="http://schemas.microsoft.com/office/powerpoint/2010/main" val="1177865438"/>
+      </p:ext>
+    </p:extLst>
+  </p:cSld>
+  <p:clrMapOvr>
+    <a:masterClrMapping/>
+  </p:clrMapOvr>
+</p:sld>
+</file>
+
+<file path=ppt/slides/slide13.xml><?xml version="1.0" encoding="utf-8"?>
+<p:sld xmlns:a="http://schemas.openxmlformats.org/drawingml/2006/main" xmlns:r="http://schemas.openxmlformats.org/officeDocument/2006/relationships" xmlns:p="http://schemas.openxmlformats.org/presentationml/2006/main">
+  <p:cSld>
+    <p:spTree>
+      <p:nvGrpSpPr>
+        <p:cNvPr id="1" name=""/>
+        <p:cNvGrpSpPr/>
+        <p:nvPr/>
+      </p:nvGrpSpPr>
+      <p:grpSpPr>
+        <a:xfrm>
+          <a:off x="0" y="0"/>
+          <a:ext cx="0" cy="0"/>
+          <a:chOff x="0" y="0"/>
+          <a:chExt cx="0" cy="0"/>
+        </a:xfrm>
+      </p:grpSpPr>
+      <p:sp>
+        <p:nvSpPr>
+          <p:cNvPr id="2" name="Titel 1"/>
+          <p:cNvSpPr>
+            <a:spLocks noGrp="1"/>
+          </p:cNvSpPr>
+          <p:nvPr>
+            <p:ph type="title"/>
+          </p:nvPr>
+        </p:nvSpPr>
+        <p:spPr/>
+        <p:txBody>
+          <a:bodyPr/>
+          <a:lstStyle/>
+          <a:p>
+            <a:r>
+              <a:rPr lang="de-DE" dirty="0" smtClean="0"/>
+              <a:t>Cross </a:t>
+            </a:r>
+            <a:r>
+              <a:rPr lang="de-DE" dirty="0" err="1" smtClean="0"/>
+              <a:t>Notifications</a:t>
+            </a:r>
+            <a:r>
+              <a:rPr lang="de-DE" dirty="0" smtClean="0"/>
+              <a:t> in </a:t>
+            </a:r>
+            <a:r>
+              <a:rPr lang="de-DE" dirty="0" err="1" smtClean="0"/>
+              <a:t>Unity</a:t>
+            </a:r>
+            <a:endParaRPr lang="de-DE" dirty="0"/>
+          </a:p>
+        </p:txBody>
+      </p:sp>
+      <p:sp>
+        <p:nvSpPr>
+          <p:cNvPr id="3" name="Inhaltsplatzhalter 2"/>
+          <p:cNvSpPr>
+            <a:spLocks noGrp="1"/>
+          </p:cNvSpPr>
+          <p:nvPr>
+            <p:ph idx="1"/>
+          </p:nvPr>
+        </p:nvSpPr>
+        <p:spPr/>
+        <p:txBody>
+          <a:bodyPr>
+            <a:normAutofit/>
+          </a:bodyPr>
+          <a:lstStyle/>
+          <a:p>
+            <a:pPr marL="514350" indent="-457200"/>
+            <a:r>
+              <a:rPr lang="de-DE" dirty="0"/>
+              <a:t>Easy Cross-</a:t>
+            </a:r>
+            <a:r>
+              <a:rPr lang="de-DE" dirty="0" err="1"/>
+              <a:t>Platform</a:t>
+            </a:r>
+            <a:r>
+              <a:rPr lang="de-DE" dirty="0"/>
+              <a:t> </a:t>
+            </a:r>
+            <a:r>
+              <a:rPr lang="de-DE" dirty="0" err="1"/>
+              <a:t>Notifications</a:t>
+            </a:r>
+            <a:r>
+              <a:rPr lang="de-DE" dirty="0"/>
+              <a:t> </a:t>
+            </a:r>
+            <a:r>
+              <a:rPr lang="de-DE" dirty="0" err="1" smtClean="0"/>
+              <a:t>Plugin</a:t>
+            </a:r>
+            <a:endParaRPr lang="de-DE" dirty="0" smtClean="0"/>
+          </a:p>
+          <a:p>
+            <a:pPr marL="914400" lvl="1" indent="-457200"/>
+            <a:r>
+              <a:rPr lang="de-DE" dirty="0" smtClean="0"/>
+              <a:t>Frage mit </a:t>
+            </a:r>
+            <a:r>
+              <a:rPr lang="de-DE" dirty="0" err="1" smtClean="0"/>
+              <a:t>Use</a:t>
+            </a:r>
+            <a:r>
+              <a:rPr lang="de-DE" dirty="0" smtClean="0"/>
+              <a:t>-Cases an Entwickler:</a:t>
+            </a:r>
+            <a:endParaRPr lang="de-DE" dirty="0"/>
+          </a:p>
+        </p:txBody>
+      </p:sp>
+      <p:sp>
+        <p:nvSpPr>
+          <p:cNvPr id="6" name="Fußzeilenplatzhalter 5"/>
+          <p:cNvSpPr>
+            <a:spLocks noGrp="1"/>
+          </p:cNvSpPr>
+          <p:nvPr>
+            <p:ph type="ftr" sz="quarter" idx="11"/>
+          </p:nvPr>
+        </p:nvSpPr>
+        <p:spPr/>
+        <p:txBody>
+          <a:bodyPr/>
+          <a:lstStyle/>
+          <a:p>
+            <a:r>
+              <a:rPr lang="de-DE" smtClean="0"/>
+              <a:t>Aquatic Space - Back End</a:t>
+            </a:r>
+            <a:endParaRPr lang="de-DE"/>
+          </a:p>
+        </p:txBody>
+      </p:sp>
+      <p:sp>
+        <p:nvSpPr>
+          <p:cNvPr id="7" name="Foliennummernplatzhalter 6"/>
+          <p:cNvSpPr>
+            <a:spLocks noGrp="1"/>
+          </p:cNvSpPr>
+          <p:nvPr>
+            <p:ph type="sldNum" sz="quarter" idx="12"/>
+          </p:nvPr>
+        </p:nvSpPr>
+        <p:spPr/>
+        <p:txBody>
+          <a:bodyPr/>
+          <a:lstStyle/>
+          <a:p>
+            <a:fld id="{2E18F249-BDE3-A64A-9BF3-08DB2E7D85BD}" type="slidenum">
+              <a:rPr lang="de-DE" smtClean="0"/>
+              <a:t>13</a:t>
+            </a:fld>
+            <a:endParaRPr lang="de-DE"/>
+          </a:p>
+        </p:txBody>
+      </p:sp>
+      <p:pic>
+        <p:nvPicPr>
+          <p:cNvPr id="4" name="Bild 3" descr="Screenshot 2013-10-28 19.57.40.png"/>
+          <p:cNvPicPr>
+            <a:picLocks noChangeAspect="1"/>
+          </p:cNvPicPr>
+          <p:nvPr/>
+        </p:nvPicPr>
+        <p:blipFill>
+          <a:blip r:embed="rId2">
+            <a:extLst>
+              <a:ext uri="{28A0092B-C50C-407E-A947-70E740481C1C}">
+                <a14:useLocalDpi xmlns:a14="http://schemas.microsoft.com/office/drawing/2010/main" val="0"/>
+              </a:ext>
+            </a:extLst>
+          </a:blip>
+          <a:stretch>
+            <a:fillRect/>
+          </a:stretch>
+        </p:blipFill>
+        <p:spPr>
+          <a:xfrm>
+            <a:off x="0" y="3114159"/>
+            <a:ext cx="9144000" cy="2149272"/>
+          </a:xfrm>
+          <a:prstGeom prst="rect">
+            <a:avLst/>
+          </a:prstGeom>
+        </p:spPr>
+      </p:pic>
+    </p:spTree>
+    <p:extLst>
+      <p:ext uri="{BB962C8B-B14F-4D97-AF65-F5344CB8AC3E}">
+        <p14:creationId xmlns:p14="http://schemas.microsoft.com/office/powerpoint/2010/main" val="4103525835"/>
+      </p:ext>
+    </p:extLst>
+  </p:cSld>
+  <p:clrMapOvr>
+    <a:masterClrMapping/>
+  </p:clrMapOvr>
+</p:sld>
+</file>
+
+<file path=ppt/slides/slide14.xml><?xml version="1.0" encoding="utf-8"?>
+<p:sld xmlns:a="http://schemas.openxmlformats.org/drawingml/2006/main" xmlns:r="http://schemas.openxmlformats.org/officeDocument/2006/relationships" xmlns:p="http://schemas.openxmlformats.org/presentationml/2006/main">
+  <p:cSld>
+    <p:spTree>
+      <p:nvGrpSpPr>
+        <p:cNvPr id="1" name=""/>
+        <p:cNvGrpSpPr/>
+        <p:nvPr/>
+      </p:nvGrpSpPr>
+      <p:grpSpPr>
+        <a:xfrm>
+          <a:off x="0" y="0"/>
+          <a:ext cx="0" cy="0"/>
+          <a:chOff x="0" y="0"/>
+          <a:chExt cx="0" cy="0"/>
+        </a:xfrm>
+      </p:grpSpPr>
+      <p:sp>
+        <p:nvSpPr>
+          <p:cNvPr id="2" name="Titel 1"/>
+          <p:cNvSpPr>
+            <a:spLocks noGrp="1"/>
+          </p:cNvSpPr>
+          <p:nvPr>
+            <p:ph type="title"/>
+          </p:nvPr>
+        </p:nvSpPr>
+        <p:spPr/>
+        <p:txBody>
+          <a:bodyPr/>
+          <a:lstStyle/>
+          <a:p>
+            <a:r>
+              <a:rPr lang="de-DE" dirty="0" smtClean="0"/>
+              <a:t>Cross </a:t>
+            </a:r>
+            <a:r>
+              <a:rPr lang="de-DE" dirty="0" err="1" smtClean="0"/>
+              <a:t>Notifications</a:t>
+            </a:r>
+            <a:r>
+              <a:rPr lang="de-DE" dirty="0" smtClean="0"/>
+              <a:t> in </a:t>
+            </a:r>
+            <a:r>
+              <a:rPr lang="de-DE" dirty="0" err="1" smtClean="0"/>
+              <a:t>Unity</a:t>
+            </a:r>
+            <a:endParaRPr lang="de-DE" dirty="0"/>
+          </a:p>
+        </p:txBody>
+      </p:sp>
+      <p:sp>
+        <p:nvSpPr>
+          <p:cNvPr id="3" name="Inhaltsplatzhalter 2"/>
+          <p:cNvSpPr>
+            <a:spLocks noGrp="1"/>
+          </p:cNvSpPr>
+          <p:nvPr>
+            <p:ph idx="1"/>
+          </p:nvPr>
+        </p:nvSpPr>
+        <p:spPr/>
+        <p:txBody>
+          <a:bodyPr>
+            <a:normAutofit/>
+          </a:bodyPr>
+          <a:lstStyle/>
+          <a:p>
+            <a:pPr marL="514350" indent="-457200"/>
+            <a:r>
+              <a:rPr lang="de-DE" dirty="0"/>
+              <a:t>Easy Cross-</a:t>
+            </a:r>
+            <a:r>
+              <a:rPr lang="de-DE" dirty="0" err="1"/>
+              <a:t>Platform</a:t>
+            </a:r>
+            <a:r>
+              <a:rPr lang="de-DE" dirty="0"/>
+              <a:t> </a:t>
+            </a:r>
+            <a:r>
+              <a:rPr lang="de-DE" dirty="0" err="1"/>
+              <a:t>Notifications</a:t>
+            </a:r>
+            <a:r>
+              <a:rPr lang="de-DE" dirty="0"/>
+              <a:t> </a:t>
+            </a:r>
+            <a:r>
+              <a:rPr lang="de-DE" dirty="0" err="1" smtClean="0"/>
+              <a:t>Plugin</a:t>
+            </a:r>
+            <a:endParaRPr lang="de-DE" dirty="0" smtClean="0"/>
+          </a:p>
+          <a:p>
+            <a:pPr marL="914400" lvl="1" indent="-457200"/>
+            <a:r>
+              <a:rPr lang="de-DE" dirty="0" smtClean="0"/>
+              <a:t>Antwort vom Entwickler:</a:t>
+            </a:r>
+            <a:endParaRPr lang="de-DE" dirty="0"/>
+          </a:p>
+        </p:txBody>
+      </p:sp>
+      <p:sp>
+        <p:nvSpPr>
+          <p:cNvPr id="6" name="Fußzeilenplatzhalter 5"/>
+          <p:cNvSpPr>
+            <a:spLocks noGrp="1"/>
+          </p:cNvSpPr>
+          <p:nvPr>
+            <p:ph type="ftr" sz="quarter" idx="11"/>
+          </p:nvPr>
+        </p:nvSpPr>
+        <p:spPr/>
+        <p:txBody>
+          <a:bodyPr/>
+          <a:lstStyle/>
+          <a:p>
+            <a:r>
+              <a:rPr lang="de-DE" smtClean="0"/>
+              <a:t>Aquatic Space - Back End</a:t>
+            </a:r>
+            <a:endParaRPr lang="de-DE"/>
+          </a:p>
+        </p:txBody>
+      </p:sp>
+      <p:sp>
+        <p:nvSpPr>
+          <p:cNvPr id="7" name="Foliennummernplatzhalter 6"/>
+          <p:cNvSpPr>
+            <a:spLocks noGrp="1"/>
+          </p:cNvSpPr>
+          <p:nvPr>
+            <p:ph type="sldNum" sz="quarter" idx="12"/>
+          </p:nvPr>
+        </p:nvSpPr>
+        <p:spPr/>
+        <p:txBody>
+          <a:bodyPr/>
+          <a:lstStyle/>
+          <a:p>
+            <a:fld id="{2E18F249-BDE3-A64A-9BF3-08DB2E7D85BD}" type="slidenum">
+              <a:rPr lang="de-DE" smtClean="0"/>
+              <a:t>14</a:t>
+            </a:fld>
+            <a:endParaRPr lang="de-DE"/>
+          </a:p>
+        </p:txBody>
+      </p:sp>
+      <p:pic>
+        <p:nvPicPr>
+          <p:cNvPr id="5" name="Bild 4" descr="Screenshot 2013-10-28 19.57.57.png"/>
+          <p:cNvPicPr>
+            <a:picLocks noChangeAspect="1"/>
+          </p:cNvPicPr>
+          <p:nvPr/>
+        </p:nvPicPr>
+        <p:blipFill>
+          <a:blip r:embed="rId2">
+            <a:extLst>
+              <a:ext uri="{28A0092B-C50C-407E-A947-70E740481C1C}">
+                <a14:useLocalDpi xmlns:a14="http://schemas.microsoft.com/office/drawing/2010/main" val="0"/>
+              </a:ext>
+            </a:extLst>
+          </a:blip>
+          <a:stretch>
+            <a:fillRect/>
+          </a:stretch>
+        </p:blipFill>
+        <p:spPr>
+          <a:xfrm>
+            <a:off x="92183" y="2697163"/>
+            <a:ext cx="8064736" cy="6858000"/>
+          </a:xfrm>
+          <a:prstGeom prst="rect">
+            <a:avLst/>
+          </a:prstGeom>
+        </p:spPr>
+      </p:pic>
+    </p:spTree>
+    <p:extLst>
+      <p:ext uri="{BB962C8B-B14F-4D97-AF65-F5344CB8AC3E}">
+        <p14:creationId xmlns:p14="http://schemas.microsoft.com/office/powerpoint/2010/main" val="511671377"/>
+      </p:ext>
+    </p:extLst>
+  </p:cSld>
+  <p:clrMapOvr>
+    <a:masterClrMapping/>
+  </p:clrMapOvr>
+</p:sld>
+</file>
+
 <file path=ppt/slides/slide2.xml><?xml version="1.0" encoding="utf-8"?>
 <p:sld xmlns:a="http://schemas.openxmlformats.org/drawingml/2006/main" xmlns:r="http://schemas.openxmlformats.org/officeDocument/2006/relationships" xmlns:p="http://schemas.openxmlformats.org/presentationml/2006/main">
   <p:cSld>
@@ -4970,7 +5445,6 @@
               <a:rPr lang="de-DE" dirty="0" smtClean="0"/>
               <a:t>wegen Parent + Child App</a:t>
             </a:r>
-            <a:endParaRPr lang="de-DE" dirty="0" smtClean="0"/>
           </a:p>
         </p:txBody>
       </p:sp>
@@ -5956,7 +6430,6 @@
               <a:rPr lang="de-DE" dirty="0" smtClean="0"/>
               <a:t> Pattern</a:t>
             </a:r>
-            <a:endParaRPr lang="de-DE" dirty="0" smtClean="0"/>
           </a:p>
           <a:p>
             <a:pPr lvl="1"/>
@@ -6840,101 +7313,118 @@
           </a:bodyPr>
           <a:lstStyle/>
           <a:p>
-            <a:pPr marL="514350" indent="-457200"/>
-            <a:r>
-              <a:rPr lang="de-DE" dirty="0"/>
-              <a:t>Easy Cross-</a:t>
-            </a:r>
-            <a:r>
-              <a:rPr lang="de-DE" dirty="0" err="1"/>
+            <a:r>
+              <a:rPr lang="de-DE" dirty="0" err="1" smtClean="0"/>
+              <a:t>PhoneGap</a:t>
+            </a:r>
+            <a:endParaRPr lang="de-DE" dirty="0" smtClean="0"/>
+          </a:p>
+          <a:p>
+            <a:pPr lvl="1"/>
+            <a:r>
+              <a:rPr lang="de-DE" dirty="0" smtClean="0"/>
+              <a:t>Pro:</a:t>
+            </a:r>
+          </a:p>
+          <a:p>
+            <a:pPr lvl="2"/>
+            <a:r>
+              <a:rPr lang="de-DE" dirty="0" smtClean="0"/>
+              <a:t>Hilfreich für Cross-</a:t>
+            </a:r>
+            <a:r>
+              <a:rPr lang="de-DE" dirty="0" err="1" smtClean="0"/>
               <a:t>Platform</a:t>
             </a:r>
             <a:r>
-              <a:rPr lang="de-DE" dirty="0"/>
+              <a:rPr lang="de-DE" dirty="0" smtClean="0"/>
               <a:t> </a:t>
             </a:r>
             <a:r>
-              <a:rPr lang="de-DE" dirty="0" err="1"/>
+              <a:rPr lang="de-DE" dirty="0" err="1" smtClean="0"/>
+              <a:t>Parents</a:t>
+            </a:r>
+            <a:r>
+              <a:rPr lang="de-DE" dirty="0" smtClean="0"/>
+              <a:t>-App</a:t>
+            </a:r>
+          </a:p>
+          <a:p>
+            <a:pPr lvl="1"/>
+            <a:r>
+              <a:rPr lang="de-DE" dirty="0" smtClean="0"/>
+              <a:t>Con:</a:t>
+            </a:r>
+          </a:p>
+          <a:p>
+            <a:pPr lvl="2"/>
+            <a:r>
+              <a:rPr lang="de-DE" dirty="0" smtClean="0"/>
+              <a:t>Push </a:t>
+            </a:r>
+            <a:r>
+              <a:rPr lang="de-DE" dirty="0" err="1" smtClean="0"/>
               <a:t>Notifications</a:t>
             </a:r>
             <a:r>
-              <a:rPr lang="de-DE" dirty="0"/>
+              <a:rPr lang="de-DE" dirty="0" smtClean="0"/>
+              <a:t> nur durch </a:t>
+            </a:r>
+            <a:r>
+              <a:rPr lang="de-DE" dirty="0" err="1" smtClean="0"/>
+              <a:t>Plugins</a:t>
+            </a:r>
+            <a:r>
+              <a:rPr lang="de-DE" dirty="0" smtClean="0"/>
               <a:t> </a:t>
             </a:r>
             <a:r>
               <a:rPr lang="de-DE" dirty="0" err="1" smtClean="0"/>
-              <a:t>Plugin</a:t>
-            </a:r>
-            <a:endParaRPr lang="de-DE" dirty="0"/>
-          </a:p>
-          <a:p>
-            <a:pPr lvl="1"/>
-            <a:r>
-              <a:rPr lang="de-DE" dirty="0" smtClean="0"/>
-              <a:t>Pro:</a:t>
-            </a:r>
+              <a:t>einbindbar</a:t>
+            </a:r>
+            <a:endParaRPr lang="de-DE" dirty="0" smtClean="0"/>
           </a:p>
           <a:p>
             <a:pPr lvl="2"/>
             <a:r>
               <a:rPr lang="de-DE" dirty="0" smtClean="0"/>
-              <a:t>SDK für </a:t>
-            </a:r>
-            <a:r>
-              <a:rPr lang="de-DE" dirty="0" err="1" smtClean="0"/>
-              <a:t>iOS</a:t>
-            </a:r>
-            <a:r>
-              <a:rPr lang="de-DE" dirty="0" smtClean="0"/>
-              <a:t> &amp; </a:t>
-            </a:r>
-            <a:r>
-              <a:rPr lang="de-DE" dirty="0" err="1" smtClean="0"/>
-              <a:t>Android</a:t>
-            </a:r>
-            <a:r>
-              <a:rPr lang="de-DE" dirty="0" smtClean="0"/>
-              <a:t> Push </a:t>
-            </a:r>
-            <a:r>
-              <a:rPr lang="de-DE" dirty="0" err="1" smtClean="0"/>
-              <a:t>Notification</a:t>
-            </a:r>
-            <a:r>
-              <a:rPr lang="de-DE" dirty="0" smtClean="0"/>
-              <a:t> Empfang</a:t>
-            </a:r>
-          </a:p>
-          <a:p>
-            <a:pPr lvl="2"/>
-            <a:r>
-              <a:rPr lang="de-DE" dirty="0" smtClean="0"/>
-              <a:t>Einmalig 40€</a:t>
-            </a:r>
-          </a:p>
-          <a:p>
-            <a:pPr lvl="1"/>
-            <a:r>
-              <a:rPr lang="de-DE" dirty="0" smtClean="0"/>
-              <a:t>Con:</a:t>
-            </a:r>
-          </a:p>
-          <a:p>
-            <a:pPr lvl="2"/>
-            <a:r>
-              <a:rPr lang="de-DE" dirty="0"/>
-              <a:t>Keine kostenlose Testversion</a:t>
-            </a:r>
-          </a:p>
-          <a:p>
-            <a:pPr lvl="2"/>
-            <a:r>
-              <a:rPr lang="de-DE" dirty="0" smtClean="0"/>
-              <a:t>Nur client-seitige Lösung</a:t>
-            </a:r>
-          </a:p>
-        </p:txBody>
-      </p:sp>
+              <a:t>Schönere Alternative: </a:t>
+            </a:r>
+            <a:r>
+              <a:rPr lang="de-DE" dirty="0" err="1" smtClean="0"/>
+              <a:t>Xamarin</a:t>
+            </a:r>
+            <a:r>
+              <a:rPr lang="de-DE" dirty="0" smtClean="0"/>
+              <a:t> + Parse SDK</a:t>
+            </a:r>
+          </a:p>
+        </p:txBody>
+      </p:sp>
+      <p:pic>
+        <p:nvPicPr>
+          <p:cNvPr id="5" name="Bild 4"/>
+          <p:cNvPicPr>
+            <a:picLocks noChangeAspect="1"/>
+          </p:cNvPicPr>
+          <p:nvPr/>
+        </p:nvPicPr>
+        <p:blipFill>
+          <a:blip r:embed="rId2"/>
+          <a:stretch>
+            <a:fillRect/>
+          </a:stretch>
+        </p:blipFill>
+        <p:spPr>
+          <a:xfrm>
+            <a:off x="3021453" y="1244135"/>
+            <a:ext cx="1344577" cy="1344577"/>
+          </a:xfrm>
+          <a:prstGeom prst="rect">
+            <a:avLst/>
+          </a:prstGeom>
+        </p:spPr>
+      </p:pic>
       <p:sp>
         <p:nvSpPr>
           <p:cNvPr id="6" name="Fußzeilenplatzhalter 5"/>
@@ -6984,7 +7474,7 @@
     </p:spTree>
     <p:extLst>
       <p:ext uri="{BB962C8B-B14F-4D97-AF65-F5344CB8AC3E}">
-        <p14:creationId xmlns:p14="http://schemas.microsoft.com/office/powerpoint/2010/main" val="1177865438"/>
+        <p14:creationId xmlns:p14="http://schemas.microsoft.com/office/powerpoint/2010/main" val="857423768"/>
       </p:ext>
     </p:extLst>
   </p:cSld>

</xml_diff>